<commit_message>
making origin up to date with local (4 yrs later)
</commit_message>
<xml_diff>
--- a/plot_final_temptool_testing.pptx
+++ b/plot_final_temptool_testing.pptx
@@ -7,6 +7,7 @@
   <p:sldIdLst>
     <p:sldId id="256" r:id="rId2"/>
     <p:sldId id="257" r:id="rId3"/>
+    <p:sldId id="258" r:id="rId4"/>
   </p:sldIdLst>
   <p:sldSz cx="12192000" cy="6858000"/>
   <p:notesSz cx="6858000" cy="9144000"/>
@@ -105,6 +106,11 @@
       </a:defRPr>
     </a:lvl9pPr>
   </p:defaultTextStyle>
+  <p:extLst>
+    <p:ext uri="{EFAFB233-063F-42B5-8137-9DF3F51BA10A}">
+      <p15:sldGuideLst xmlns:p15="http://schemas.microsoft.com/office/powerpoint/2012/main"/>
+    </p:ext>
+  </p:extLst>
 </p:presentation>
 </file>
 
@@ -255,7 +261,7 @@
           <a:p>
             <a:fld id="{E6DA418D-D603-4E66-8824-92EE82F5DD0E}" type="datetimeFigureOut">
               <a:rPr lang="en-US" smtClean="0"/>
-              <a:t>11/30/2021</a:t>
+              <a:t>3/27/2022</a:t>
             </a:fld>
             <a:endParaRPr lang="en-US"/>
           </a:p>
@@ -453,7 +459,7 @@
           <a:p>
             <a:fld id="{E6DA418D-D603-4E66-8824-92EE82F5DD0E}" type="datetimeFigureOut">
               <a:rPr lang="en-US" smtClean="0"/>
-              <a:t>11/30/2021</a:t>
+              <a:t>3/27/2022</a:t>
             </a:fld>
             <a:endParaRPr lang="en-US"/>
           </a:p>
@@ -661,7 +667,7 @@
           <a:p>
             <a:fld id="{E6DA418D-D603-4E66-8824-92EE82F5DD0E}" type="datetimeFigureOut">
               <a:rPr lang="en-US" smtClean="0"/>
-              <a:t>11/30/2021</a:t>
+              <a:t>3/27/2022</a:t>
             </a:fld>
             <a:endParaRPr lang="en-US"/>
           </a:p>
@@ -859,7 +865,7 @@
           <a:p>
             <a:fld id="{E6DA418D-D603-4E66-8824-92EE82F5DD0E}" type="datetimeFigureOut">
               <a:rPr lang="en-US" smtClean="0"/>
-              <a:t>11/30/2021</a:t>
+              <a:t>3/27/2022</a:t>
             </a:fld>
             <a:endParaRPr lang="en-US"/>
           </a:p>
@@ -1134,7 +1140,7 @@
           <a:p>
             <a:fld id="{E6DA418D-D603-4E66-8824-92EE82F5DD0E}" type="datetimeFigureOut">
               <a:rPr lang="en-US" smtClean="0"/>
-              <a:t>11/30/2021</a:t>
+              <a:t>3/27/2022</a:t>
             </a:fld>
             <a:endParaRPr lang="en-US"/>
           </a:p>
@@ -1399,7 +1405,7 @@
           <a:p>
             <a:fld id="{E6DA418D-D603-4E66-8824-92EE82F5DD0E}" type="datetimeFigureOut">
               <a:rPr lang="en-US" smtClean="0"/>
-              <a:t>11/30/2021</a:t>
+              <a:t>3/27/2022</a:t>
             </a:fld>
             <a:endParaRPr lang="en-US"/>
           </a:p>
@@ -1811,7 +1817,7 @@
           <a:p>
             <a:fld id="{E6DA418D-D603-4E66-8824-92EE82F5DD0E}" type="datetimeFigureOut">
               <a:rPr lang="en-US" smtClean="0"/>
-              <a:t>11/30/2021</a:t>
+              <a:t>3/27/2022</a:t>
             </a:fld>
             <a:endParaRPr lang="en-US"/>
           </a:p>
@@ -1952,7 +1958,7 @@
           <a:p>
             <a:fld id="{E6DA418D-D603-4E66-8824-92EE82F5DD0E}" type="datetimeFigureOut">
               <a:rPr lang="en-US" smtClean="0"/>
-              <a:t>11/30/2021</a:t>
+              <a:t>3/27/2022</a:t>
             </a:fld>
             <a:endParaRPr lang="en-US"/>
           </a:p>
@@ -2065,7 +2071,7 @@
           <a:p>
             <a:fld id="{E6DA418D-D603-4E66-8824-92EE82F5DD0E}" type="datetimeFigureOut">
               <a:rPr lang="en-US" smtClean="0"/>
-              <a:t>11/30/2021</a:t>
+              <a:t>3/27/2022</a:t>
             </a:fld>
             <a:endParaRPr lang="en-US"/>
           </a:p>
@@ -2376,7 +2382,7 @@
           <a:p>
             <a:fld id="{E6DA418D-D603-4E66-8824-92EE82F5DD0E}" type="datetimeFigureOut">
               <a:rPr lang="en-US" smtClean="0"/>
-              <a:t>11/30/2021</a:t>
+              <a:t>3/27/2022</a:t>
             </a:fld>
             <a:endParaRPr lang="en-US"/>
           </a:p>
@@ -2664,7 +2670,7 @@
           <a:p>
             <a:fld id="{E6DA418D-D603-4E66-8824-92EE82F5DD0E}" type="datetimeFigureOut">
               <a:rPr lang="en-US" smtClean="0"/>
-              <a:t>11/30/2021</a:t>
+              <a:t>3/27/2022</a:t>
             </a:fld>
             <a:endParaRPr lang="en-US"/>
           </a:p>
@@ -2905,7 +2911,7 @@
           <a:p>
             <a:fld id="{E6DA418D-D603-4E66-8824-92EE82F5DD0E}" type="datetimeFigureOut">
               <a:rPr lang="en-US" smtClean="0"/>
-              <a:t>11/30/2021</a:t>
+              <a:t>3/27/2022</a:t>
             </a:fld>
             <a:endParaRPr lang="en-US"/>
           </a:p>
@@ -3528,6 +3534,514 @@
             </a:p>
           </p:txBody>
         </p:sp>
+        <mc:AlternateContent xmlns:mc="http://schemas.openxmlformats.org/markup-compatibility/2006" xmlns:a14="http://schemas.microsoft.com/office/drawing/2010/main">
+          <mc:Choice Requires="a14">
+            <p:sp>
+              <p:nvSpPr>
+                <p:cNvPr id="6" name="TextBox 5">
+                  <a:extLst>
+                    <a:ext uri="{FF2B5EF4-FFF2-40B4-BE49-F238E27FC236}">
+                      <a16:creationId xmlns:a16="http://schemas.microsoft.com/office/drawing/2014/main" id="{9CAF0618-27BD-49DF-9692-BDACF3CBCC61}"/>
+                    </a:ext>
+                  </a:extLst>
+                </p:cNvPr>
+                <p:cNvSpPr txBox="1"/>
+                <p:nvPr/>
+              </p:nvSpPr>
+              <p:spPr>
+                <a:xfrm>
+                  <a:off x="6067162" y="2696866"/>
+                  <a:ext cx="1686188" cy="263534"/>
+                </a:xfrm>
+                <a:prstGeom prst="rect">
+                  <a:avLst/>
+                </a:prstGeom>
+                <a:noFill/>
+              </p:spPr>
+              <p:txBody>
+                <a:bodyPr wrap="square" rtlCol="0">
+                  <a:spAutoFit/>
+                </a:bodyPr>
+                <a:lstStyle/>
+                <a:p>
+                  <a:pPr/>
+                  <a14:m>
+                    <m:oMathPara xmlns:m="http://schemas.openxmlformats.org/officeDocument/2006/math">
+                      <m:oMathParaPr>
+                        <m:jc m:val="centerGroup"/>
+                      </m:oMathParaPr>
+                      <m:oMath xmlns:m="http://schemas.openxmlformats.org/officeDocument/2006/math">
+                        <m:r>
+                          <a:rPr lang="en-US" sz="1100" b="0" i="1" smtClean="0">
+                            <a:solidFill>
+                              <a:srgbClr val="1189FF"/>
+                            </a:solidFill>
+                            <a:latin typeface="Cambria Math" panose="02040503050406030204" pitchFamily="18" charset="0"/>
+                          </a:rPr>
+                          <m:t>𝑦</m:t>
+                        </m:r>
+                        <m:r>
+                          <a:rPr lang="en-US" sz="1100" b="0" i="1" smtClean="0">
+                            <a:solidFill>
+                              <a:srgbClr val="1189FF"/>
+                            </a:solidFill>
+                            <a:latin typeface="Cambria Math" panose="02040503050406030204" pitchFamily="18" charset="0"/>
+                          </a:rPr>
+                          <m:t>= </m:t>
+                        </m:r>
+                        <m:sSup>
+                          <m:sSupPr>
+                            <m:ctrlPr>
+                              <a:rPr lang="en-US" sz="1100" b="0" i="1" smtClean="0">
+                                <a:solidFill>
+                                  <a:srgbClr val="1189FF"/>
+                                </a:solidFill>
+                                <a:latin typeface="Cambria Math" panose="02040503050406030204" pitchFamily="18" charset="0"/>
+                              </a:rPr>
+                            </m:ctrlPr>
+                          </m:sSupPr>
+                          <m:e>
+                            <m:r>
+                              <a:rPr lang="en-US" sz="1100" b="0" i="1" smtClean="0">
+                                <a:solidFill>
+                                  <a:srgbClr val="1189FF"/>
+                                </a:solidFill>
+                                <a:latin typeface="Cambria Math" panose="02040503050406030204" pitchFamily="18" charset="0"/>
+                              </a:rPr>
+                              <m:t>205</m:t>
+                            </m:r>
+                            <m:r>
+                              <a:rPr lang="en-US" sz="1100" b="0" i="1" smtClean="0">
+                                <a:solidFill>
+                                  <a:srgbClr val="1189FF"/>
+                                </a:solidFill>
+                                <a:latin typeface="Cambria Math" panose="02040503050406030204" pitchFamily="18" charset="0"/>
+                              </a:rPr>
+                              <m:t>𝑒</m:t>
+                            </m:r>
+                          </m:e>
+                          <m:sup>
+                            <m:r>
+                              <a:rPr lang="en-US" sz="1100" b="0" i="1" smtClean="0">
+                                <a:solidFill>
+                                  <a:srgbClr val="1189FF"/>
+                                </a:solidFill>
+                                <a:latin typeface="Cambria Math" panose="02040503050406030204" pitchFamily="18" charset="0"/>
+                              </a:rPr>
+                              <m:t>0.0015</m:t>
+                            </m:r>
+                            <m:r>
+                              <a:rPr lang="en-US" sz="1100" b="0" i="1" smtClean="0">
+                                <a:solidFill>
+                                  <a:srgbClr val="1189FF"/>
+                                </a:solidFill>
+                                <a:latin typeface="Cambria Math" panose="02040503050406030204" pitchFamily="18" charset="0"/>
+                              </a:rPr>
+                              <m:t>𝑥</m:t>
+                            </m:r>
+                          </m:sup>
+                        </m:sSup>
+                        <m:r>
+                          <a:rPr lang="en-US" sz="1100" b="0" i="1" smtClean="0">
+                            <a:solidFill>
+                              <a:srgbClr val="1189FF"/>
+                            </a:solidFill>
+                            <a:latin typeface="Cambria Math" panose="02040503050406030204" pitchFamily="18" charset="0"/>
+                          </a:rPr>
+                          <m:t>−205</m:t>
+                        </m:r>
+                      </m:oMath>
+                    </m:oMathPara>
+                  </a14:m>
+                  <a:endParaRPr lang="en-US" sz="1100" dirty="0">
+                    <a:solidFill>
+                      <a:srgbClr val="1189FF"/>
+                    </a:solidFill>
+                  </a:endParaRPr>
+                </a:p>
+              </p:txBody>
+            </p:sp>
+          </mc:Choice>
+          <mc:Fallback xmlns="">
+            <p:sp>
+              <p:nvSpPr>
+                <p:cNvPr id="6" name="TextBox 5">
+                  <a:extLst>
+                    <a:ext uri="{FF2B5EF4-FFF2-40B4-BE49-F238E27FC236}">
+                      <a16:creationId xmlns:a16="http://schemas.microsoft.com/office/drawing/2014/main" id="{9CAF0618-27BD-49DF-9692-BDACF3CBCC61}"/>
+                    </a:ext>
+                  </a:extLst>
+                </p:cNvPr>
+                <p:cNvSpPr txBox="1">
+                  <a:spLocks noRot="1" noChangeAspect="1" noMove="1" noResize="1" noEditPoints="1" noAdjustHandles="1" noChangeArrowheads="1" noChangeShapeType="1" noTextEdit="1"/>
+                </p:cNvSpPr>
+                <p:nvPr/>
+              </p:nvSpPr>
+              <p:spPr>
+                <a:xfrm>
+                  <a:off x="6067162" y="2696866"/>
+                  <a:ext cx="1686188" cy="263534"/>
+                </a:xfrm>
+                <a:prstGeom prst="rect">
+                  <a:avLst/>
+                </a:prstGeom>
+                <a:blipFill>
+                  <a:blip r:embed="rId3"/>
+                  <a:stretch>
+                    <a:fillRect/>
+                  </a:stretch>
+                </a:blipFill>
+              </p:spPr>
+              <p:txBody>
+                <a:bodyPr/>
+                <a:lstStyle/>
+                <a:p>
+                  <a:r>
+                    <a:rPr lang="en-US">
+                      <a:noFill/>
+                    </a:rPr>
+                    <a:t> </a:t>
+                  </a:r>
+                </a:p>
+              </p:txBody>
+            </p:sp>
+          </mc:Fallback>
+        </mc:AlternateContent>
+        <mc:AlternateContent xmlns:mc="http://schemas.openxmlformats.org/markup-compatibility/2006" xmlns:a14="http://schemas.microsoft.com/office/drawing/2010/main">
+          <mc:Choice Requires="a14">
+            <p:sp>
+              <p:nvSpPr>
+                <p:cNvPr id="8" name="TextBox 7">
+                  <a:extLst>
+                    <a:ext uri="{FF2B5EF4-FFF2-40B4-BE49-F238E27FC236}">
+                      <a16:creationId xmlns:a16="http://schemas.microsoft.com/office/drawing/2014/main" id="{95BBDCAC-4C7F-46F3-94D8-1A6C2CEBAEBF}"/>
+                    </a:ext>
+                  </a:extLst>
+                </p:cNvPr>
+                <p:cNvSpPr txBox="1"/>
+                <p:nvPr/>
+              </p:nvSpPr>
+              <p:spPr>
+                <a:xfrm>
+                  <a:off x="6067162" y="5979523"/>
+                  <a:ext cx="1686188" cy="247888"/>
+                </a:xfrm>
+                <a:prstGeom prst="rect">
+                  <a:avLst/>
+                </a:prstGeom>
+                <a:noFill/>
+              </p:spPr>
+              <p:txBody>
+                <a:bodyPr wrap="square" rtlCol="0">
+                  <a:spAutoFit/>
+                </a:bodyPr>
+                <a:lstStyle/>
+                <a:p>
+                  <a:pPr/>
+                  <a14:m>
+                    <m:oMathPara xmlns:m="http://schemas.openxmlformats.org/officeDocument/2006/math">
+                      <m:oMathParaPr>
+                        <m:jc m:val="centerGroup"/>
+                      </m:oMathParaPr>
+                      <m:oMath xmlns:m="http://schemas.openxmlformats.org/officeDocument/2006/math">
+                        <m:r>
+                          <a:rPr lang="en-US" sz="1000" b="0" i="1" smtClean="0">
+                            <a:solidFill>
+                              <a:srgbClr val="1189FF"/>
+                            </a:solidFill>
+                            <a:latin typeface="Cambria Math" panose="02040503050406030204" pitchFamily="18" charset="0"/>
+                          </a:rPr>
+                          <m:t>𝑦</m:t>
+                        </m:r>
+                        <m:r>
+                          <a:rPr lang="en-US" sz="1000" b="0" i="1" smtClean="0">
+                            <a:solidFill>
+                              <a:srgbClr val="1189FF"/>
+                            </a:solidFill>
+                            <a:latin typeface="Cambria Math" panose="02040503050406030204" pitchFamily="18" charset="0"/>
+                          </a:rPr>
+                          <m:t>= </m:t>
+                        </m:r>
+                        <m:sSup>
+                          <m:sSupPr>
+                            <m:ctrlPr>
+                              <a:rPr lang="en-US" sz="1000" b="0" i="1" smtClean="0">
+                                <a:solidFill>
+                                  <a:srgbClr val="1189FF"/>
+                                </a:solidFill>
+                                <a:latin typeface="Cambria Math" panose="02040503050406030204" pitchFamily="18" charset="0"/>
+                              </a:rPr>
+                            </m:ctrlPr>
+                          </m:sSupPr>
+                          <m:e>
+                            <m:r>
+                              <a:rPr lang="en-US" sz="1000" b="0" i="1" smtClean="0">
+                                <a:solidFill>
+                                  <a:srgbClr val="1189FF"/>
+                                </a:solidFill>
+                                <a:latin typeface="Cambria Math" panose="02040503050406030204" pitchFamily="18" charset="0"/>
+                              </a:rPr>
+                              <m:t>16.2</m:t>
+                            </m:r>
+                            <m:r>
+                              <a:rPr lang="en-US" sz="1000" b="0" i="1" smtClean="0">
+                                <a:solidFill>
+                                  <a:srgbClr val="1189FF"/>
+                                </a:solidFill>
+                                <a:latin typeface="Cambria Math" panose="02040503050406030204" pitchFamily="18" charset="0"/>
+                              </a:rPr>
+                              <m:t>𝑒</m:t>
+                            </m:r>
+                          </m:e>
+                          <m:sup>
+                            <m:r>
+                              <a:rPr lang="en-US" sz="1000" b="0" i="1" smtClean="0">
+                                <a:solidFill>
+                                  <a:srgbClr val="1189FF"/>
+                                </a:solidFill>
+                                <a:latin typeface="Cambria Math" panose="02040503050406030204" pitchFamily="18" charset="0"/>
+                              </a:rPr>
+                              <m:t>−0.0065</m:t>
+                            </m:r>
+                            <m:r>
+                              <a:rPr lang="en-US" sz="1000" b="0" i="1" smtClean="0">
+                                <a:solidFill>
+                                  <a:srgbClr val="1189FF"/>
+                                </a:solidFill>
+                                <a:latin typeface="Cambria Math" panose="02040503050406030204" pitchFamily="18" charset="0"/>
+                              </a:rPr>
+                              <m:t>𝑥</m:t>
+                            </m:r>
+                          </m:sup>
+                        </m:sSup>
+                        <m:r>
+                          <a:rPr lang="en-US" sz="1000" b="0" i="1" smtClean="0">
+                            <a:solidFill>
+                              <a:srgbClr val="1189FF"/>
+                            </a:solidFill>
+                            <a:latin typeface="Cambria Math" panose="02040503050406030204" pitchFamily="18" charset="0"/>
+                          </a:rPr>
+                          <m:t>−16.2</m:t>
+                        </m:r>
+                      </m:oMath>
+                    </m:oMathPara>
+                  </a14:m>
+                  <a:endParaRPr lang="en-US" sz="1000" dirty="0">
+                    <a:solidFill>
+                      <a:srgbClr val="1189FF"/>
+                    </a:solidFill>
+                  </a:endParaRPr>
+                </a:p>
+              </p:txBody>
+            </p:sp>
+          </mc:Choice>
+          <mc:Fallback xmlns="">
+            <p:sp>
+              <p:nvSpPr>
+                <p:cNvPr id="8" name="TextBox 7">
+                  <a:extLst>
+                    <a:ext uri="{FF2B5EF4-FFF2-40B4-BE49-F238E27FC236}">
+                      <a16:creationId xmlns:a16="http://schemas.microsoft.com/office/drawing/2014/main" id="{95BBDCAC-4C7F-46F3-94D8-1A6C2CEBAEBF}"/>
+                    </a:ext>
+                  </a:extLst>
+                </p:cNvPr>
+                <p:cNvSpPr txBox="1">
+                  <a:spLocks noRot="1" noChangeAspect="1" noMove="1" noResize="1" noEditPoints="1" noAdjustHandles="1" noChangeArrowheads="1" noChangeShapeType="1" noTextEdit="1"/>
+                </p:cNvSpPr>
+                <p:nvPr/>
+              </p:nvSpPr>
+              <p:spPr>
+                <a:xfrm>
+                  <a:off x="6067162" y="5979523"/>
+                  <a:ext cx="1686188" cy="247888"/>
+                </a:xfrm>
+                <a:prstGeom prst="rect">
+                  <a:avLst/>
+                </a:prstGeom>
+                <a:blipFill>
+                  <a:blip r:embed="rId4"/>
+                  <a:stretch>
+                    <a:fillRect/>
+                  </a:stretch>
+                </a:blipFill>
+              </p:spPr>
+              <p:txBody>
+                <a:bodyPr/>
+                <a:lstStyle/>
+                <a:p>
+                  <a:r>
+                    <a:rPr lang="en-US">
+                      <a:noFill/>
+                    </a:rPr>
+                    <a:t> </a:t>
+                  </a:r>
+                </a:p>
+              </p:txBody>
+            </p:sp>
+          </mc:Fallback>
+        </mc:AlternateContent>
+      </p:grpSp>
+    </p:spTree>
+    <p:extLst>
+      <p:ext uri="{BB962C8B-B14F-4D97-AF65-F5344CB8AC3E}">
+        <p14:creationId xmlns:p14="http://schemas.microsoft.com/office/powerpoint/2010/main" val="2935364574"/>
+      </p:ext>
+    </p:extLst>
+  </p:cSld>
+  <p:clrMapOvr>
+    <a:masterClrMapping/>
+  </p:clrMapOvr>
+</p:sld>
+</file>
+
+<file path=ppt/slides/slide3.xml><?xml version="1.0" encoding="utf-8"?>
+<p:sld xmlns:a="http://schemas.openxmlformats.org/drawingml/2006/main" xmlns:r="http://schemas.openxmlformats.org/officeDocument/2006/relationships" xmlns:p="http://schemas.openxmlformats.org/presentationml/2006/main">
+  <p:cSld>
+    <p:spTree>
+      <p:nvGrpSpPr>
+        <p:cNvPr id="1" name=""/>
+        <p:cNvGrpSpPr/>
+        <p:nvPr/>
+      </p:nvGrpSpPr>
+      <p:grpSpPr>
+        <a:xfrm>
+          <a:off x="0" y="0"/>
+          <a:ext cx="0" cy="0"/>
+          <a:chOff x="0" y="0"/>
+          <a:chExt cx="0" cy="0"/>
+        </a:xfrm>
+      </p:grpSpPr>
+      <p:pic>
+        <p:nvPicPr>
+          <p:cNvPr id="3" name="Picture 2">
+            <a:extLst>
+              <a:ext uri="{FF2B5EF4-FFF2-40B4-BE49-F238E27FC236}">
+                <a16:creationId xmlns:a16="http://schemas.microsoft.com/office/drawing/2014/main" id="{348A8837-8FE6-4317-9C5B-3A3304A852F1}"/>
+              </a:ext>
+            </a:extLst>
+          </p:cNvPr>
+          <p:cNvPicPr>
+            <a:picLocks noChangeAspect="1"/>
+          </p:cNvPicPr>
+          <p:nvPr/>
+        </p:nvPicPr>
+        <p:blipFill>
+          <a:blip r:embed="rId2">
+            <a:extLst>
+              <a:ext uri="{28A0092B-C50C-407E-A947-70E740481C1C}">
+                <a14:useLocalDpi xmlns:a14="http://schemas.microsoft.com/office/drawing/2010/main" val="0"/>
+              </a:ext>
+            </a:extLst>
+          </a:blip>
+          <a:srcRect/>
+          <a:stretch/>
+        </p:blipFill>
+        <p:spPr>
+          <a:xfrm>
+            <a:off x="4438650" y="0"/>
+            <a:ext cx="3314700" cy="6857999"/>
+          </a:xfrm>
+          <a:prstGeom prst="rect">
+            <a:avLst/>
+          </a:prstGeom>
+        </p:spPr>
+      </p:pic>
+      <p:grpSp>
+        <p:nvGrpSpPr>
+          <p:cNvPr id="2" name="Group 1">
+            <a:extLst>
+              <a:ext uri="{FF2B5EF4-FFF2-40B4-BE49-F238E27FC236}">
+                <a16:creationId xmlns:a16="http://schemas.microsoft.com/office/drawing/2014/main" id="{58AA1CD3-CFC2-4231-81EE-A61CBB11737B}"/>
+              </a:ext>
+            </a:extLst>
+          </p:cNvPr>
+          <p:cNvGrpSpPr/>
+          <p:nvPr/>
+        </p:nvGrpSpPr>
+        <p:grpSpPr>
+          <a:xfrm>
+            <a:off x="4865614" y="62809"/>
+            <a:ext cx="2887736" cy="6164602"/>
+            <a:chOff x="4865614" y="62809"/>
+            <a:chExt cx="2887736" cy="6164602"/>
+          </a:xfrm>
+        </p:grpSpPr>
+        <p:sp>
+          <p:nvSpPr>
+            <p:cNvPr id="4" name="TextBox 3">
+              <a:extLst>
+                <a:ext uri="{FF2B5EF4-FFF2-40B4-BE49-F238E27FC236}">
+                  <a16:creationId xmlns:a16="http://schemas.microsoft.com/office/drawing/2014/main" id="{09622329-100D-4496-BF77-FCFD981D558C}"/>
+                </a:ext>
+              </a:extLst>
+            </p:cNvPr>
+            <p:cNvSpPr txBox="1"/>
+            <p:nvPr/>
+          </p:nvSpPr>
+          <p:spPr>
+            <a:xfrm>
+              <a:off x="4865614" y="62809"/>
+              <a:ext cx="302004" cy="461665"/>
+            </a:xfrm>
+            <a:prstGeom prst="rect">
+              <a:avLst/>
+            </a:prstGeom>
+            <a:noFill/>
+          </p:spPr>
+          <p:txBody>
+            <a:bodyPr wrap="square" rtlCol="0">
+              <a:spAutoFit/>
+            </a:bodyPr>
+            <a:lstStyle/>
+            <a:p>
+              <a:r>
+                <a:rPr lang="en-US" sz="2400" b="1" dirty="0">
+                  <a:latin typeface="Arial" panose="020B0604020202020204" pitchFamily="34" charset="0"/>
+                  <a:cs typeface="Arial" panose="020B0604020202020204" pitchFamily="34" charset="0"/>
+                </a:rPr>
+                <a:t>A</a:t>
+              </a:r>
+            </a:p>
+          </p:txBody>
+        </p:sp>
+        <p:sp>
+          <p:nvSpPr>
+            <p:cNvPr id="5" name="TextBox 4">
+              <a:extLst>
+                <a:ext uri="{FF2B5EF4-FFF2-40B4-BE49-F238E27FC236}">
+                  <a16:creationId xmlns:a16="http://schemas.microsoft.com/office/drawing/2014/main" id="{AFA3F5B3-DE71-4FC0-9A56-C09275D903B4}"/>
+                </a:ext>
+              </a:extLst>
+            </p:cNvPr>
+            <p:cNvSpPr txBox="1"/>
+            <p:nvPr/>
+          </p:nvSpPr>
+          <p:spPr>
+            <a:xfrm>
+              <a:off x="4865614" y="3339430"/>
+              <a:ext cx="302004" cy="461665"/>
+            </a:xfrm>
+            <a:prstGeom prst="rect">
+              <a:avLst/>
+            </a:prstGeom>
+            <a:noFill/>
+          </p:spPr>
+          <p:txBody>
+            <a:bodyPr wrap="square" rtlCol="0">
+              <a:spAutoFit/>
+            </a:bodyPr>
+            <a:lstStyle/>
+            <a:p>
+              <a:r>
+                <a:rPr lang="en-US" sz="2400" b="1" dirty="0">
+                  <a:latin typeface="Arial" panose="020B0604020202020204" pitchFamily="34" charset="0"/>
+                  <a:cs typeface="Arial" panose="020B0604020202020204" pitchFamily="34" charset="0"/>
+                </a:rPr>
+                <a:t>B</a:t>
+              </a:r>
+            </a:p>
+          </p:txBody>
+        </p:sp>
         <mc:AlternateContent xmlns:mc="http://schemas.openxmlformats.org/markup-compatibility/2006">
           <mc:Choice xmlns:a14="http://schemas.microsoft.com/office/drawing/2010/main" Requires="a14">
             <p:sp>
@@ -3558,6 +4072,7 @@
                 </a:bodyPr>
                 <a:lstStyle/>
                 <a:p>
+                  <a:pPr/>
                   <a14:m>
                     <m:oMathPara xmlns:m="http://schemas.openxmlformats.org/officeDocument/2006/math">
                       <m:oMathParaPr>
@@ -3730,6 +4245,7 @@
                 </a:bodyPr>
                 <a:lstStyle/>
                 <a:p>
+                  <a:pPr/>
                   <a14:m>
                     <m:oMathPara xmlns:m="http://schemas.openxmlformats.org/officeDocument/2006/math">
                       <m:oMathParaPr>
@@ -3773,15 +4289,6 @@
                                 </a:solidFill>
                                 <a:latin typeface="Cambria Math" panose="02040503050406030204" pitchFamily="18" charset="0"/>
                               </a:rPr>
-                              <m:t>16.2</m:t>
-                            </m:r>
-                            <m:r>
-                              <a:rPr lang="en-US" sz="1000" b="0" i="1" smtClean="0">
-                                <a:solidFill>
-                                  <a:srgbClr val="1189FF"/>
-                                </a:solidFill>
-                                <a:latin typeface="Cambria Math" panose="02040503050406030204" pitchFamily="18" charset="0"/>
-                              </a:rPr>
                               <m:t>𝑒</m:t>
                             </m:r>
                           </m:e>
@@ -3806,15 +4313,6 @@
                             </m:r>
                           </m:sup>
                         </m:sSup>
-                        <m:r>
-                          <a:rPr lang="en-US" sz="1000" b="0" i="1" smtClean="0">
-                            <a:solidFill>
-                              <a:srgbClr val="1189FF"/>
-                            </a:solidFill>
-                            <a:latin typeface="Cambria Math" panose="02040503050406030204" pitchFamily="18" charset="0"/>
-                          </a:rPr>
-                          <m:t>−16.2</m:t>
-                        </m:r>
                       </m:oMath>
                     </m:oMathPara>
                   </a14:m>
@@ -3876,7 +4374,7 @@
     </p:spTree>
     <p:extLst>
       <p:ext uri="{BB962C8B-B14F-4D97-AF65-F5344CB8AC3E}">
-        <p14:creationId xmlns:p14="http://schemas.microsoft.com/office/powerpoint/2010/main" val="2935364574"/>
+        <p14:creationId xmlns:p14="http://schemas.microsoft.com/office/powerpoint/2010/main" val="389549025"/>
       </p:ext>
     </p:extLst>
   </p:cSld>

</xml_diff>